<commit_message>
UI improved, category added
</commit_message>
<xml_diff>
--- a/Deal of the Day.pptx
+++ b/Deal of the Day.pptx
@@ -118,7 +118,7 @@
   </p:defaultTextStyle>
   <p:extLst>
     <p:ext uri="{EFAFB233-063F-42B5-8137-9DF3F51BA10A}">
-      <p15:sldGuideLst xmlns:p15="http://schemas.microsoft.com/office/powerpoint/2012/main" xmlns="">
+      <p15:sldGuideLst xmlns="" xmlns:p15="http://schemas.microsoft.com/office/powerpoint/2012/main">
         <p15:guide id="1" orient="horz" pos="2160">
           <p15:clr>
             <a:srgbClr val="A4A3A4"/>
@@ -319,7 +319,7 @@
     </p:spTree>
     <p:extLst>
       <p:ext uri="{BB962C8B-B14F-4D97-AF65-F5344CB8AC3E}">
-        <p14:creationId xmlns:p14="http://schemas.microsoft.com/office/powerpoint/2010/main" xmlns="" val="3488775338"/>
+        <p14:creationId xmlns="" xmlns:p14="http://schemas.microsoft.com/office/powerpoint/2010/main" val="3488775338"/>
       </p:ext>
     </p:extLst>
   </p:cSld>
@@ -491,7 +491,7 @@
     </p:spTree>
     <p:extLst>
       <p:ext uri="{BB962C8B-B14F-4D97-AF65-F5344CB8AC3E}">
-        <p14:creationId xmlns:p14="http://schemas.microsoft.com/office/powerpoint/2010/main" xmlns="" val="173118798"/>
+        <p14:creationId xmlns="" xmlns:p14="http://schemas.microsoft.com/office/powerpoint/2010/main" val="173118798"/>
       </p:ext>
     </p:extLst>
   </p:cSld>
@@ -673,7 +673,7 @@
     </p:spTree>
     <p:extLst>
       <p:ext uri="{BB962C8B-B14F-4D97-AF65-F5344CB8AC3E}">
-        <p14:creationId xmlns:p14="http://schemas.microsoft.com/office/powerpoint/2010/main" xmlns="" val="4178831711"/>
+        <p14:creationId xmlns="" xmlns:p14="http://schemas.microsoft.com/office/powerpoint/2010/main" val="4178831711"/>
       </p:ext>
     </p:extLst>
   </p:cSld>
@@ -845,7 +845,7 @@
     </p:spTree>
     <p:extLst>
       <p:ext uri="{BB962C8B-B14F-4D97-AF65-F5344CB8AC3E}">
-        <p14:creationId xmlns:p14="http://schemas.microsoft.com/office/powerpoint/2010/main" xmlns="" val="3902737326"/>
+        <p14:creationId xmlns="" xmlns:p14="http://schemas.microsoft.com/office/powerpoint/2010/main" val="3902737326"/>
       </p:ext>
     </p:extLst>
   </p:cSld>
@@ -1093,7 +1093,7 @@
     </p:spTree>
     <p:extLst>
       <p:ext uri="{BB962C8B-B14F-4D97-AF65-F5344CB8AC3E}">
-        <p14:creationId xmlns:p14="http://schemas.microsoft.com/office/powerpoint/2010/main" xmlns="" val="3204718209"/>
+        <p14:creationId xmlns="" xmlns:p14="http://schemas.microsoft.com/office/powerpoint/2010/main" val="3204718209"/>
       </p:ext>
     </p:extLst>
   </p:cSld>
@@ -1327,7 +1327,7 @@
     </p:spTree>
     <p:extLst>
       <p:ext uri="{BB962C8B-B14F-4D97-AF65-F5344CB8AC3E}">
-        <p14:creationId xmlns:p14="http://schemas.microsoft.com/office/powerpoint/2010/main" xmlns="" val="3031755494"/>
+        <p14:creationId xmlns="" xmlns:p14="http://schemas.microsoft.com/office/powerpoint/2010/main" val="3031755494"/>
       </p:ext>
     </p:extLst>
   </p:cSld>
@@ -1696,7 +1696,7 @@
     </p:spTree>
     <p:extLst>
       <p:ext uri="{BB962C8B-B14F-4D97-AF65-F5344CB8AC3E}">
-        <p14:creationId xmlns:p14="http://schemas.microsoft.com/office/powerpoint/2010/main" xmlns="" val="485928492"/>
+        <p14:creationId xmlns="" xmlns:p14="http://schemas.microsoft.com/office/powerpoint/2010/main" val="485928492"/>
       </p:ext>
     </p:extLst>
   </p:cSld>
@@ -1816,7 +1816,7 @@
     </p:spTree>
     <p:extLst>
       <p:ext uri="{BB962C8B-B14F-4D97-AF65-F5344CB8AC3E}">
-        <p14:creationId xmlns:p14="http://schemas.microsoft.com/office/powerpoint/2010/main" xmlns="" val="416862464"/>
+        <p14:creationId xmlns="" xmlns:p14="http://schemas.microsoft.com/office/powerpoint/2010/main" val="416862464"/>
       </p:ext>
     </p:extLst>
   </p:cSld>
@@ -1913,7 +1913,7 @@
     </p:spTree>
     <p:extLst>
       <p:ext uri="{BB962C8B-B14F-4D97-AF65-F5344CB8AC3E}">
-        <p14:creationId xmlns:p14="http://schemas.microsoft.com/office/powerpoint/2010/main" xmlns="" val="430009557"/>
+        <p14:creationId xmlns="" xmlns:p14="http://schemas.microsoft.com/office/powerpoint/2010/main" val="430009557"/>
       </p:ext>
     </p:extLst>
   </p:cSld>
@@ -2192,7 +2192,7 @@
     </p:spTree>
     <p:extLst>
       <p:ext uri="{BB962C8B-B14F-4D97-AF65-F5344CB8AC3E}">
-        <p14:creationId xmlns:p14="http://schemas.microsoft.com/office/powerpoint/2010/main" xmlns="" val="1292984254"/>
+        <p14:creationId xmlns="" xmlns:p14="http://schemas.microsoft.com/office/powerpoint/2010/main" val="1292984254"/>
       </p:ext>
     </p:extLst>
   </p:cSld>
@@ -2447,7 +2447,7 @@
     </p:spTree>
     <p:extLst>
       <p:ext uri="{BB962C8B-B14F-4D97-AF65-F5344CB8AC3E}">
-        <p14:creationId xmlns:p14="http://schemas.microsoft.com/office/powerpoint/2010/main" xmlns="" val="1198195870"/>
+        <p14:creationId xmlns="" xmlns:p14="http://schemas.microsoft.com/office/powerpoint/2010/main" val="1198195870"/>
       </p:ext>
     </p:extLst>
   </p:cSld>
@@ -2698,7 +2698,7 @@
     </p:spTree>
     <p:extLst>
       <p:ext uri="{BB962C8B-B14F-4D97-AF65-F5344CB8AC3E}">
-        <p14:creationId xmlns:p14="http://schemas.microsoft.com/office/powerpoint/2010/main" xmlns="" val="3631958936"/>
+        <p14:creationId xmlns="" xmlns:p14="http://schemas.microsoft.com/office/powerpoint/2010/main" val="3631958936"/>
       </p:ext>
     </p:extLst>
   </p:cSld>
@@ -3361,7 +3361,7 @@
     </p:spTree>
     <p:extLst>
       <p:ext uri="{BB962C8B-B14F-4D97-AF65-F5344CB8AC3E}">
-        <p14:creationId xmlns:p14="http://schemas.microsoft.com/office/powerpoint/2010/main" xmlns="" val="2124129392"/>
+        <p14:creationId xmlns="" xmlns:p14="http://schemas.microsoft.com/office/powerpoint/2010/main" val="2124129392"/>
       </p:ext>
     </p:extLst>
   </p:cSld>
@@ -3521,13 +3521,20 @@
     </p:spTree>
     <p:extLst>
       <p:ext uri="{BB962C8B-B14F-4D97-AF65-F5344CB8AC3E}">
-        <p14:creationId xmlns:p14="http://schemas.microsoft.com/office/powerpoint/2010/main" xmlns="" val="3543755828"/>
+        <p14:creationId xmlns="" xmlns:p14="http://schemas.microsoft.com/office/powerpoint/2010/main" val="3543755828"/>
       </p:ext>
     </p:extLst>
   </p:cSld>
   <p:clrMapOvr>
     <a:masterClrMapping/>
   </p:clrMapOvr>
+  <p:timing>
+    <p:tnLst>
+      <p:par>
+        <p:cTn id="1" dur="indefinite" restart="never" nodeType="tmRoot"/>
+      </p:par>
+    </p:tnLst>
+  </p:timing>
 </p:sld>
 </file>
 
@@ -3643,13 +3650,20 @@
     </p:spTree>
     <p:extLst>
       <p:ext uri="{BB962C8B-B14F-4D97-AF65-F5344CB8AC3E}">
-        <p14:creationId xmlns:p14="http://schemas.microsoft.com/office/powerpoint/2010/main" xmlns="" val="1772519859"/>
+        <p14:creationId xmlns="" xmlns:p14="http://schemas.microsoft.com/office/powerpoint/2010/main" val="1772519859"/>
       </p:ext>
     </p:extLst>
   </p:cSld>
   <p:clrMapOvr>
     <a:masterClrMapping/>
   </p:clrMapOvr>
+  <p:timing>
+    <p:tnLst>
+      <p:par>
+        <p:cTn id="1" dur="indefinite" restart="never" nodeType="tmRoot"/>
+      </p:par>
+    </p:tnLst>
+  </p:timing>
 </p:sld>
 </file>
 
@@ -3757,13 +3771,20 @@
     </p:spTree>
     <p:extLst>
       <p:ext uri="{BB962C8B-B14F-4D97-AF65-F5344CB8AC3E}">
-        <p14:creationId xmlns:p14="http://schemas.microsoft.com/office/powerpoint/2010/main" xmlns="" val="2000001495"/>
+        <p14:creationId xmlns="" xmlns:p14="http://schemas.microsoft.com/office/powerpoint/2010/main" val="2000001495"/>
       </p:ext>
     </p:extLst>
   </p:cSld>
   <p:clrMapOvr>
     <a:masterClrMapping/>
   </p:clrMapOvr>
+  <p:timing>
+    <p:tnLst>
+      <p:par>
+        <p:cTn id="1" dur="indefinite" restart="never" nodeType="tmRoot"/>
+      </p:par>
+    </p:tnLst>
+  </p:timing>
 </p:sld>
 </file>
 
@@ -3821,13 +3842,20 @@
     </p:spTree>
     <p:extLst>
       <p:ext uri="{BB962C8B-B14F-4D97-AF65-F5344CB8AC3E}">
-        <p14:creationId xmlns:p14="http://schemas.microsoft.com/office/powerpoint/2010/main" xmlns="" val="4101906751"/>
+        <p14:creationId xmlns="" xmlns:p14="http://schemas.microsoft.com/office/powerpoint/2010/main" val="4101906751"/>
       </p:ext>
     </p:extLst>
   </p:cSld>
   <p:clrMapOvr>
     <a:masterClrMapping/>
   </p:clrMapOvr>
+  <p:timing>
+    <p:tnLst>
+      <p:par>
+        <p:cTn id="1" dur="indefinite" restart="never" nodeType="tmRoot"/>
+      </p:par>
+    </p:tnLst>
+  </p:timing>
 </p:sld>
 </file>
 
@@ -3948,7 +3976,7 @@
     </p:spTree>
     <p:extLst>
       <p:ext uri="{BB962C8B-B14F-4D97-AF65-F5344CB8AC3E}">
-        <p14:creationId xmlns:p14="http://schemas.microsoft.com/office/powerpoint/2010/main" xmlns="" val="2468282"/>
+        <p14:creationId xmlns="" xmlns:p14="http://schemas.microsoft.com/office/powerpoint/2010/main" val="2468282"/>
       </p:ext>
     </p:extLst>
   </p:cSld>
@@ -4040,13 +4068,20 @@
     </p:spTree>
     <p:extLst>
       <p:ext uri="{BB962C8B-B14F-4D97-AF65-F5344CB8AC3E}">
-        <p14:creationId xmlns:p14="http://schemas.microsoft.com/office/powerpoint/2010/main" xmlns="" val="1219637463"/>
+        <p14:creationId xmlns="" xmlns:p14="http://schemas.microsoft.com/office/powerpoint/2010/main" val="1219637463"/>
       </p:ext>
     </p:extLst>
   </p:cSld>
   <p:clrMapOvr>
     <a:masterClrMapping/>
   </p:clrMapOvr>
+  <p:timing>
+    <p:tnLst>
+      <p:par>
+        <p:cTn id="1" dur="indefinite" restart="never" nodeType="tmRoot"/>
+      </p:par>
+    </p:tnLst>
+  </p:timing>
 </p:sld>
 </file>
 
@@ -4156,13 +4191,20 @@
     </p:spTree>
     <p:extLst>
       <p:ext uri="{BB962C8B-B14F-4D97-AF65-F5344CB8AC3E}">
-        <p14:creationId xmlns:p14="http://schemas.microsoft.com/office/powerpoint/2010/main" xmlns="" val="4245458169"/>
+        <p14:creationId xmlns="" xmlns:p14="http://schemas.microsoft.com/office/powerpoint/2010/main" val="4245458169"/>
       </p:ext>
     </p:extLst>
   </p:cSld>
   <p:clrMapOvr>
     <a:masterClrMapping/>
   </p:clrMapOvr>
+  <p:timing>
+    <p:tnLst>
+      <p:par>
+        <p:cTn id="1" dur="indefinite" restart="never" nodeType="tmRoot"/>
+      </p:par>
+    </p:tnLst>
+  </p:timing>
 </p:sld>
 </file>
 
@@ -4240,13 +4282,20 @@
     </p:spTree>
     <p:extLst>
       <p:ext uri="{BB962C8B-B14F-4D97-AF65-F5344CB8AC3E}">
-        <p14:creationId xmlns:p14="http://schemas.microsoft.com/office/powerpoint/2010/main" xmlns="" val="4191110998"/>
+        <p14:creationId xmlns="" xmlns:p14="http://schemas.microsoft.com/office/powerpoint/2010/main" val="4191110998"/>
       </p:ext>
     </p:extLst>
   </p:cSld>
   <p:clrMapOvr>
     <a:masterClrMapping/>
   </p:clrMapOvr>
+  <p:timing>
+    <p:tnLst>
+      <p:par>
+        <p:cTn id="1" dur="indefinite" restart="never" nodeType="tmRoot"/>
+      </p:par>
+    </p:tnLst>
+  </p:timing>
 </p:sld>
 </file>
 
@@ -4369,6 +4418,9 @@
             </a:r>
           </a:p>
           <a:p>
+            <a:pPr>
+              <a:buNone/>
+            </a:pPr>
             <a:r>
               <a:rPr lang="en-IN" dirty="0"/>
               <a:t/>
@@ -4383,13 +4435,20 @@
     </p:spTree>
     <p:extLst>
       <p:ext uri="{BB962C8B-B14F-4D97-AF65-F5344CB8AC3E}">
-        <p14:creationId xmlns:p14="http://schemas.microsoft.com/office/powerpoint/2010/main" xmlns="" val="82603902"/>
+        <p14:creationId xmlns="" xmlns:p14="http://schemas.microsoft.com/office/powerpoint/2010/main" val="82603902"/>
       </p:ext>
     </p:extLst>
   </p:cSld>
   <p:clrMapOvr>
     <a:masterClrMapping/>
   </p:clrMapOvr>
+  <p:timing>
+    <p:tnLst>
+      <p:par>
+        <p:cTn id="1" dur="indefinite" restart="never" nodeType="tmRoot"/>
+      </p:par>
+    </p:tnLst>
+  </p:timing>
 </p:sld>
 </file>
 
@@ -4573,7 +4632,7 @@
     </p:spTree>
     <p:extLst>
       <p:ext uri="{BB962C8B-B14F-4D97-AF65-F5344CB8AC3E}">
-        <p14:creationId xmlns:p14="http://schemas.microsoft.com/office/powerpoint/2010/main" xmlns="" val="2536128484"/>
+        <p14:creationId xmlns="" xmlns:p14="http://schemas.microsoft.com/office/powerpoint/2010/main" val="2536128484"/>
       </p:ext>
     </p:extLst>
   </p:cSld>
@@ -4709,7 +4768,7 @@
     </p:spTree>
     <p:extLst>
       <p:ext uri="{BB962C8B-B14F-4D97-AF65-F5344CB8AC3E}">
-        <p14:creationId xmlns:p14="http://schemas.microsoft.com/office/powerpoint/2010/main" xmlns="" val="3199028461"/>
+        <p14:creationId xmlns="" xmlns:p14="http://schemas.microsoft.com/office/powerpoint/2010/main" val="3199028461"/>
       </p:ext>
     </p:extLst>
   </p:cSld>
@@ -4841,6 +4900,13 @@
   <p:clrMapOvr>
     <a:masterClrMapping/>
   </p:clrMapOvr>
+  <p:timing>
+    <p:tnLst>
+      <p:par>
+        <p:cTn id="1" dur="indefinite" restart="never" nodeType="tmRoot"/>
+      </p:par>
+    </p:tnLst>
+  </p:timing>
 </p:sld>
 </file>
 
@@ -5133,7 +5199,7 @@
   <a:extraClrSchemeLst/>
   <a:extLst>
     <a:ext uri="{05A4C25C-085E-4340-85A3-A5531E510DB2}">
-      <thm15:themeFamily xmlns:thm15="http://schemas.microsoft.com/office/thememl/2012/main" xmlns="" name="Office Theme" id="{62F939B6-93AF-4DB8-9C6B-D6C7DFDC589F}" vid="{4A3C46E8-61CC-4603-A589-7422A47A8E4A}"/>
+      <thm15:themeFamily xmlns="" xmlns:thm15="http://schemas.microsoft.com/office/thememl/2012/main" name="Office Theme" id="{62F939B6-93AF-4DB8-9C6B-D6C7DFDC589F}" vid="{4A3C46E8-61CC-4603-A589-7422A47A8E4A}"/>
     </a:ext>
   </a:extLst>
 </a:theme>

</xml_diff>